<commit_message>
26/01/26 개발스택 PPT controller .*do -> Rest로 변경
</commit_message>
<xml_diff>
--- a/doc/개발 스택.pptx
+++ b/doc/개발 스택.pptx
@@ -4638,12 +4638,12 @@
           <a:p>
             <a:pPr algn="ctr"/>
             <a:r>
-              <a:rPr lang="en-US" altLang="ko-KR" sz="1500" dirty="0">
+              <a:rPr lang="en-US" altLang="ko-KR" sz="1500">
                 <a:solidFill>
                   <a:schemeClr val="tx1"/>
                 </a:solidFill>
               </a:rPr>
-              <a:t>*.do</a:t>
+              <a:t>Rest</a:t>
             </a:r>
             <a:endParaRPr lang="ko-KR" altLang="en-US" sz="1500" dirty="0">
               <a:solidFill>

</xml_diff>